<commit_message>
Atualizando aula 2 de Gestão WEB II
</commit_message>
<xml_diff>
--- a/Euripedes Simões de Paula/Gestão de Conteúdo WEB II/Aula 2/Web 2.0 e mídia social.pptx
+++ b/Euripedes Simões de Paula/Gestão de Conteúdo WEB II/Aula 2/Web 2.0 e mídia social.pptx
@@ -17,6 +17,13 @@
     <p:sldId id="265" r:id="rId11"/>
     <p:sldId id="266" r:id="rId12"/>
     <p:sldId id="267" r:id="rId13"/>
+    <p:sldId id="268" r:id="rId14"/>
+    <p:sldId id="269" r:id="rId15"/>
+    <p:sldId id="270" r:id="rId16"/>
+    <p:sldId id="271" r:id="rId17"/>
+    <p:sldId id="272" r:id="rId18"/>
+    <p:sldId id="273" r:id="rId19"/>
+    <p:sldId id="274" r:id="rId20"/>
   </p:sldIdLst>
   <p:sldSz cx="12192000" cy="6858000"/>
   <p:notesSz cx="6858000" cy="9144000"/>
@@ -4204,21 +4211,20 @@
           <a:p>
             <a:pPr lvl="1"/>
             <a:r>
-              <a:rPr lang="pt-BR" sz="2000"/>
-              <a:t>Forneceu </a:t>
-            </a:r>
-            <a:r>
               <a:rPr lang="pt-BR" sz="2000" dirty="0"/>
-              <a:t>I</a:t>
-            </a:r>
-            <a:r>
-              <a:rPr lang="pt-BR" sz="2000"/>
-              <a:t>nteligência </a:t>
-            </a:r>
+              <a:t>Forneceu Inteligência coletiva por compartilhamento de práticas sociais;</a:t>
+            </a:r>
+          </a:p>
+          <a:p>
+            <a:pPr lvl="1"/>
             <a:r>
               <a:rPr lang="pt-BR" sz="2000" dirty="0"/>
-              <a:t>coletiva</a:t>
-            </a:r>
+              <a:t>Aplicativos abertos para maior utilização e melhoria continua com menor tempo;</a:t>
+            </a:r>
+          </a:p>
+          <a:p>
+            <a:pPr lvl="1"/>
+            <a:endParaRPr lang="pt-BR" sz="2000" dirty="0"/>
           </a:p>
         </p:txBody>
       </p:sp>
@@ -4226,6 +4232,1262 @@
     <p:extLst>
       <p:ext uri="{BB962C8B-B14F-4D97-AF65-F5344CB8AC3E}">
         <p14:creationId xmlns:p14="http://schemas.microsoft.com/office/powerpoint/2010/main" val="1498850964"/>
+      </p:ext>
+    </p:extLst>
+  </p:cSld>
+  <p:clrMapOvr>
+    <a:masterClrMapping/>
+  </p:clrMapOvr>
+</p:sld>
+</file>
+
+<file path=ppt/slides/slide13.xml><?xml version="1.0" encoding="utf-8"?>
+<p:sld xmlns:a="http://schemas.openxmlformats.org/drawingml/2006/main" xmlns:r="http://schemas.openxmlformats.org/officeDocument/2006/relationships" xmlns:p="http://schemas.openxmlformats.org/presentationml/2006/main">
+  <p:cSld>
+    <p:spTree>
+      <p:nvGrpSpPr>
+        <p:cNvPr id="1" name=""/>
+        <p:cNvGrpSpPr/>
+        <p:nvPr/>
+      </p:nvGrpSpPr>
+      <p:grpSpPr>
+        <a:xfrm>
+          <a:off x="0" y="0"/>
+          <a:ext cx="0" cy="0"/>
+          <a:chOff x="0" y="0"/>
+          <a:chExt cx="0" cy="0"/>
+        </a:xfrm>
+      </p:grpSpPr>
+      <p:sp>
+        <p:nvSpPr>
+          <p:cNvPr id="2" name="Título 1">
+            <a:extLst>
+              <a:ext uri="{FF2B5EF4-FFF2-40B4-BE49-F238E27FC236}">
+                <a16:creationId xmlns:a16="http://schemas.microsoft.com/office/drawing/2014/main" id="{D9D1B228-D7A5-429B-6D5D-39CB076C54A3}"/>
+              </a:ext>
+            </a:extLst>
+          </p:cNvPr>
+          <p:cNvSpPr>
+            <a:spLocks noGrp="1"/>
+          </p:cNvSpPr>
+          <p:nvPr>
+            <p:ph type="title"/>
+          </p:nvPr>
+        </p:nvSpPr>
+        <p:spPr>
+          <a:xfrm>
+            <a:off x="1066800" y="0"/>
+            <a:ext cx="10058400" cy="799247"/>
+          </a:xfrm>
+        </p:spPr>
+        <p:txBody>
+          <a:bodyPr/>
+          <a:lstStyle/>
+          <a:p>
+            <a:r>
+              <a:rPr lang="pt-BR" dirty="0"/>
+              <a:t>Histórico de WEB</a:t>
+            </a:r>
+          </a:p>
+        </p:txBody>
+      </p:sp>
+      <p:graphicFrame>
+        <p:nvGraphicFramePr>
+          <p:cNvPr id="4" name="Espaço Reservado para Conteúdo 3">
+            <a:extLst>
+              <a:ext uri="{FF2B5EF4-FFF2-40B4-BE49-F238E27FC236}">
+                <a16:creationId xmlns:a16="http://schemas.microsoft.com/office/drawing/2014/main" id="{64549557-9FAD-F8F5-0F32-8F714D7DE6EC}"/>
+              </a:ext>
+            </a:extLst>
+          </p:cNvPr>
+          <p:cNvGraphicFramePr>
+            <a:graphicFrameLocks noGrp="1"/>
+          </p:cNvGraphicFramePr>
+          <p:nvPr>
+            <p:ph idx="1"/>
+            <p:extLst>
+              <p:ext uri="{D42A27DB-BD31-4B8C-83A1-F6EECF244321}">
+                <p14:modId xmlns:p14="http://schemas.microsoft.com/office/powerpoint/2010/main" val="2934746287"/>
+              </p:ext>
+            </p:extLst>
+          </p:nvPr>
+        </p:nvGraphicFramePr>
+        <p:xfrm>
+          <a:off x="0" y="799248"/>
+          <a:ext cx="12192000" cy="5514470"/>
+        </p:xfrm>
+        <a:graphic>
+          <a:graphicData uri="http://schemas.openxmlformats.org/drawingml/2006/table">
+            <a:tbl>
+              <a:tblPr firstRow="1" bandRow="1">
+                <a:tableStyleId>{5C22544A-7EE6-4342-B048-85BDC9FD1C3A}</a:tableStyleId>
+              </a:tblPr>
+              <a:tblGrid>
+                <a:gridCol w="4369964">
+                  <a:extLst>
+                    <a:ext uri="{9D8B030D-6E8A-4147-A177-3AD203B41FA5}">
+                      <a16:colId xmlns:a16="http://schemas.microsoft.com/office/drawing/2014/main" val="634650017"/>
+                    </a:ext>
+                  </a:extLst>
+                </a:gridCol>
+                <a:gridCol w="7822036">
+                  <a:extLst>
+                    <a:ext uri="{9D8B030D-6E8A-4147-A177-3AD203B41FA5}">
+                      <a16:colId xmlns:a16="http://schemas.microsoft.com/office/drawing/2014/main" val="2434874582"/>
+                    </a:ext>
+                  </a:extLst>
+                </a:gridCol>
+              </a:tblGrid>
+              <a:tr h="417291">
+                <a:tc>
+                  <a:txBody>
+                    <a:bodyPr/>
+                    <a:lstStyle/>
+                    <a:p>
+                      <a:r>
+                        <a:rPr lang="pt-BR" sz="1800" dirty="0"/>
+                        <a:t>Web 1.0</a:t>
+                      </a:r>
+                    </a:p>
+                  </a:txBody>
+                  <a:tcPr/>
+                </a:tc>
+                <a:tc>
+                  <a:txBody>
+                    <a:bodyPr/>
+                    <a:lstStyle/>
+                    <a:p>
+                      <a:r>
+                        <a:rPr lang="pt-BR" sz="1800" dirty="0"/>
+                        <a:t>Web 2.0</a:t>
+                      </a:r>
+                    </a:p>
+                  </a:txBody>
+                  <a:tcPr/>
+                </a:tc>
+                <a:extLst>
+                  <a:ext uri="{0D108BD9-81ED-4DB2-BD59-A6C34878D82A}">
+                    <a16:rowId xmlns:a16="http://schemas.microsoft.com/office/drawing/2014/main" val="209627631"/>
+                  </a:ext>
+                </a:extLst>
+              </a:tr>
+              <a:tr h="1102567">
+                <a:tc>
+                  <a:txBody>
+                    <a:bodyPr/>
+                    <a:lstStyle/>
+                    <a:p>
+                      <a:r>
+                        <a:rPr lang="pt-BR" sz="1800" dirty="0" err="1"/>
+                        <a:t>DoubleClick</a:t>
+                      </a:r>
+                      <a:r>
+                        <a:rPr lang="pt-BR" sz="1800" dirty="0"/>
+                        <a:t>: agência responsável pelas primeiras ações de mídia eletrônica utilizada na Web, atualmente pertence ao Google.</a:t>
+                      </a:r>
+                    </a:p>
+                  </a:txBody>
+                  <a:tcPr/>
+                </a:tc>
+                <a:tc>
+                  <a:txBody>
+                    <a:bodyPr/>
+                    <a:lstStyle/>
+                    <a:p>
+                      <a:r>
+                        <a:rPr lang="pt-BR" sz="1800" dirty="0"/>
+                        <a:t>Google </a:t>
+                      </a:r>
+                      <a:r>
+                        <a:rPr lang="pt-BR" sz="1800" dirty="0" err="1"/>
+                        <a:t>AdSense</a:t>
+                      </a:r>
+                      <a:r>
+                        <a:rPr lang="pt-BR" sz="1800" dirty="0"/>
+                        <a:t>: serviço de publicidade ofertado pelo Google, proporciona a proprietários de site a inscrição e utilização de espaços para anúncios e demais ofertas de serviços ou produtos.</a:t>
+                      </a:r>
+                    </a:p>
+                  </a:txBody>
+                  <a:tcPr/>
+                </a:tc>
+                <a:extLst>
+                  <a:ext uri="{0D108BD9-81ED-4DB2-BD59-A6C34878D82A}">
+                    <a16:rowId xmlns:a16="http://schemas.microsoft.com/office/drawing/2014/main" val="1274490376"/>
+                  </a:ext>
+                </a:extLst>
+              </a:tr>
+              <a:tr h="593691">
+                <a:tc>
+                  <a:txBody>
+                    <a:bodyPr/>
+                    <a:lstStyle/>
+                    <a:p>
+                      <a:r>
+                        <a:rPr lang="pt-BR" sz="1800" dirty="0" err="1"/>
+                        <a:t>Ofoto</a:t>
+                      </a:r>
+                      <a:r>
+                        <a:rPr lang="pt-BR" sz="1800" dirty="0"/>
+                        <a:t>: realiza a edição de fotografias online.</a:t>
+                      </a:r>
+                    </a:p>
+                  </a:txBody>
+                  <a:tcPr/>
+                </a:tc>
+                <a:tc>
+                  <a:txBody>
+                    <a:bodyPr/>
+                    <a:lstStyle/>
+                    <a:p>
+                      <a:r>
+                        <a:rPr lang="pt-BR" sz="1800" dirty="0"/>
+                        <a:t>Flickr: realiza a edição e o compartilhamento de imagens online.</a:t>
+                      </a:r>
+                    </a:p>
+                  </a:txBody>
+                  <a:tcPr/>
+                </a:tc>
+                <a:extLst>
+                  <a:ext uri="{0D108BD9-81ED-4DB2-BD59-A6C34878D82A}">
+                    <a16:rowId xmlns:a16="http://schemas.microsoft.com/office/drawing/2014/main" val="3003748515"/>
+                  </a:ext>
+                </a:extLst>
+              </a:tr>
+              <a:tr h="417291">
+                <a:tc>
+                  <a:txBody>
+                    <a:bodyPr/>
+                    <a:lstStyle/>
+                    <a:p>
+                      <a:r>
+                        <a:rPr lang="pt-BR" sz="1800" dirty="0"/>
+                        <a:t>Enciclopédia Britânica online</a:t>
+                      </a:r>
+                    </a:p>
+                  </a:txBody>
+                  <a:tcPr/>
+                </a:tc>
+                <a:tc>
+                  <a:txBody>
+                    <a:bodyPr/>
+                    <a:lstStyle/>
+                    <a:p>
+                      <a:r>
+                        <a:rPr lang="pt-BR" sz="1800" dirty="0"/>
+                        <a:t>Sites de informação coletiva como a Wikipedia</a:t>
+                      </a:r>
+                    </a:p>
+                  </a:txBody>
+                  <a:tcPr/>
+                </a:tc>
+                <a:extLst>
+                  <a:ext uri="{0D108BD9-81ED-4DB2-BD59-A6C34878D82A}">
+                    <a16:rowId xmlns:a16="http://schemas.microsoft.com/office/drawing/2014/main" val="2617370354"/>
+                  </a:ext>
+                </a:extLst>
+              </a:tr>
+              <a:tr h="720775">
+                <a:tc>
+                  <a:txBody>
+                    <a:bodyPr/>
+                    <a:lstStyle/>
+                    <a:p>
+                      <a:r>
+                        <a:rPr lang="pt-BR" sz="1800" dirty="0"/>
+                        <a:t>Websites pessoais.</a:t>
+                      </a:r>
+                    </a:p>
+                  </a:txBody>
+                  <a:tcPr/>
+                </a:tc>
+                <a:tc>
+                  <a:txBody>
+                    <a:bodyPr/>
+                    <a:lstStyle/>
+                    <a:p>
+                      <a:r>
+                        <a:rPr lang="pt-BR" sz="1800" dirty="0"/>
+                        <a:t>Blogs interativos contemplando empresas, profissionais liberais e pessoas que utilizam para fins sociais.</a:t>
+                      </a:r>
+                    </a:p>
+                  </a:txBody>
+                  <a:tcPr/>
+                </a:tc>
+                <a:extLst>
+                  <a:ext uri="{0D108BD9-81ED-4DB2-BD59-A6C34878D82A}">
+                    <a16:rowId xmlns:a16="http://schemas.microsoft.com/office/drawing/2014/main" val="536735847"/>
+                  </a:ext>
+                </a:extLst>
+              </a:tr>
+              <a:tr h="417291">
+                <a:tc>
+                  <a:txBody>
+                    <a:bodyPr/>
+                    <a:lstStyle/>
+                    <a:p>
+                      <a:r>
+                        <a:rPr lang="pt-BR" sz="1800" dirty="0"/>
+                        <a:t>Especulação de domínios. </a:t>
+                      </a:r>
+                    </a:p>
+                  </a:txBody>
+                  <a:tcPr/>
+                </a:tc>
+                <a:tc>
+                  <a:txBody>
+                    <a:bodyPr/>
+                    <a:lstStyle/>
+                    <a:p>
+                      <a:r>
+                        <a:rPr lang="pt-BR" sz="1800" dirty="0"/>
+                        <a:t>Grande utilização de ferramentas de buscas.</a:t>
+                      </a:r>
+                    </a:p>
+                  </a:txBody>
+                  <a:tcPr/>
+                </a:tc>
+                <a:extLst>
+                  <a:ext uri="{0D108BD9-81ED-4DB2-BD59-A6C34878D82A}">
+                    <a16:rowId xmlns:a16="http://schemas.microsoft.com/office/drawing/2014/main" val="3824591055"/>
+                  </a:ext>
+                </a:extLst>
+              </a:tr>
+              <a:tr h="593691">
+                <a:tc>
+                  <a:txBody>
+                    <a:bodyPr/>
+                    <a:lstStyle/>
+                    <a:p>
+                      <a:r>
+                        <a:rPr lang="pt-BR" sz="1800" dirty="0"/>
+                        <a:t>Visita a páginas com pouco monitoramento.</a:t>
+                      </a:r>
+                    </a:p>
+                  </a:txBody>
+                  <a:tcPr/>
+                </a:tc>
+                <a:tc>
+                  <a:txBody>
+                    <a:bodyPr/>
+                    <a:lstStyle/>
+                    <a:p>
+                      <a:r>
+                        <a:rPr lang="pt-BR" sz="1800" dirty="0"/>
+                        <a:t>Controle e custos por click.</a:t>
+                      </a:r>
+                    </a:p>
+                  </a:txBody>
+                  <a:tcPr/>
+                </a:tc>
+                <a:extLst>
+                  <a:ext uri="{0D108BD9-81ED-4DB2-BD59-A6C34878D82A}">
+                    <a16:rowId xmlns:a16="http://schemas.microsoft.com/office/drawing/2014/main" val="2520187743"/>
+                  </a:ext>
+                </a:extLst>
+              </a:tr>
+              <a:tr h="417291">
+                <a:tc>
+                  <a:txBody>
+                    <a:bodyPr/>
+                    <a:lstStyle/>
+                    <a:p>
+                      <a:r>
+                        <a:rPr lang="pt-BR" sz="1800" dirty="0" err="1"/>
+                        <a:t>Screen</a:t>
+                      </a:r>
+                      <a:r>
+                        <a:rPr lang="pt-BR" sz="1800" dirty="0"/>
+                        <a:t> </a:t>
+                      </a:r>
+                      <a:r>
+                        <a:rPr lang="pt-BR" sz="1800" dirty="0" err="1"/>
+                        <a:t>scraping</a:t>
+                      </a:r>
+                      <a:endParaRPr lang="pt-BR" sz="1800" dirty="0"/>
+                    </a:p>
+                  </a:txBody>
+                  <a:tcPr/>
+                </a:tc>
+                <a:tc>
+                  <a:txBody>
+                    <a:bodyPr/>
+                    <a:lstStyle/>
+                    <a:p>
+                      <a:r>
+                        <a:rPr lang="pt-BR" sz="1800" dirty="0"/>
+                        <a:t>Web </a:t>
+                      </a:r>
+                      <a:r>
+                        <a:rPr lang="pt-BR" sz="1800" dirty="0" err="1"/>
+                        <a:t>services</a:t>
+                      </a:r>
+                      <a:r>
+                        <a:rPr lang="pt-BR" sz="1800" dirty="0"/>
+                        <a:t>.</a:t>
+                      </a:r>
+                    </a:p>
+                  </a:txBody>
+                  <a:tcPr/>
+                </a:tc>
+                <a:extLst>
+                  <a:ext uri="{0D108BD9-81ED-4DB2-BD59-A6C34878D82A}">
+                    <a16:rowId xmlns:a16="http://schemas.microsoft.com/office/drawing/2014/main" val="1000069560"/>
+                  </a:ext>
+                </a:extLst>
+              </a:tr>
+              <a:tr h="417291">
+                <a:tc>
+                  <a:txBody>
+                    <a:bodyPr/>
+                    <a:lstStyle/>
+                    <a:p>
+                      <a:r>
+                        <a:rPr lang="pt-BR" sz="1800" dirty="0"/>
+                        <a:t>Publicações sem interação.</a:t>
+                      </a:r>
+                    </a:p>
+                  </a:txBody>
+                  <a:tcPr/>
+                </a:tc>
+                <a:tc>
+                  <a:txBody>
+                    <a:bodyPr/>
+                    <a:lstStyle/>
+                    <a:p>
+                      <a:r>
+                        <a:rPr lang="pt-BR" sz="1800" dirty="0"/>
+                        <a:t>Participação ativa na confecção de conteúdos.</a:t>
+                      </a:r>
+                    </a:p>
+                  </a:txBody>
+                  <a:tcPr/>
+                </a:tc>
+                <a:extLst>
+                  <a:ext uri="{0D108BD9-81ED-4DB2-BD59-A6C34878D82A}">
+                    <a16:rowId xmlns:a16="http://schemas.microsoft.com/office/drawing/2014/main" val="697372347"/>
+                  </a:ext>
+                </a:extLst>
+              </a:tr>
+              <a:tr h="417291">
+                <a:tc>
+                  <a:txBody>
+                    <a:bodyPr/>
+                    <a:lstStyle/>
+                    <a:p>
+                      <a:r>
+                        <a:rPr lang="pt-BR" sz="1800" dirty="0"/>
+                        <a:t>Sistema de gerenciamento de conteúdo.</a:t>
+                      </a:r>
+                    </a:p>
+                  </a:txBody>
+                  <a:tcPr/>
+                </a:tc>
+                <a:tc>
+                  <a:txBody>
+                    <a:bodyPr/>
+                    <a:lstStyle/>
+                    <a:p>
+                      <a:r>
+                        <a:rPr lang="pt-BR" sz="1800" dirty="0"/>
+                        <a:t>Wikis interativas.</a:t>
+                      </a:r>
+                    </a:p>
+                  </a:txBody>
+                  <a:tcPr/>
+                </a:tc>
+                <a:extLst>
+                  <a:ext uri="{0D108BD9-81ED-4DB2-BD59-A6C34878D82A}">
+                    <a16:rowId xmlns:a16="http://schemas.microsoft.com/office/drawing/2014/main" val="2027259495"/>
+                  </a:ext>
+                </a:extLst>
+              </a:tr>
+            </a:tbl>
+          </a:graphicData>
+        </a:graphic>
+      </p:graphicFrame>
+    </p:spTree>
+    <p:extLst>
+      <p:ext uri="{BB962C8B-B14F-4D97-AF65-F5344CB8AC3E}">
+        <p14:creationId xmlns:p14="http://schemas.microsoft.com/office/powerpoint/2010/main" val="4080686089"/>
+      </p:ext>
+    </p:extLst>
+  </p:cSld>
+  <p:clrMapOvr>
+    <a:masterClrMapping/>
+  </p:clrMapOvr>
+</p:sld>
+</file>
+
+<file path=ppt/slides/slide14.xml><?xml version="1.0" encoding="utf-8"?>
+<p:sld xmlns:a="http://schemas.openxmlformats.org/drawingml/2006/main" xmlns:r="http://schemas.openxmlformats.org/officeDocument/2006/relationships" xmlns:p="http://schemas.openxmlformats.org/presentationml/2006/main">
+  <p:cSld>
+    <p:spTree>
+      <p:nvGrpSpPr>
+        <p:cNvPr id="1" name=""/>
+        <p:cNvGrpSpPr/>
+        <p:nvPr/>
+      </p:nvGrpSpPr>
+      <p:grpSpPr>
+        <a:xfrm>
+          <a:off x="0" y="0"/>
+          <a:ext cx="0" cy="0"/>
+          <a:chOff x="0" y="0"/>
+          <a:chExt cx="0" cy="0"/>
+        </a:xfrm>
+      </p:grpSpPr>
+      <p:sp>
+        <p:nvSpPr>
+          <p:cNvPr id="2" name="Título 1">
+            <a:extLst>
+              <a:ext uri="{FF2B5EF4-FFF2-40B4-BE49-F238E27FC236}">
+                <a16:creationId xmlns:a16="http://schemas.microsoft.com/office/drawing/2014/main" id="{D9D1B228-D7A5-429B-6D5D-39CB076C54A3}"/>
+              </a:ext>
+            </a:extLst>
+          </p:cNvPr>
+          <p:cNvSpPr>
+            <a:spLocks noGrp="1"/>
+          </p:cNvSpPr>
+          <p:nvPr>
+            <p:ph type="title"/>
+          </p:nvPr>
+        </p:nvSpPr>
+        <p:spPr/>
+        <p:txBody>
+          <a:bodyPr/>
+          <a:lstStyle/>
+          <a:p>
+            <a:r>
+              <a:rPr lang="pt-BR" dirty="0"/>
+              <a:t>Histórico de WEB</a:t>
+            </a:r>
+          </a:p>
+        </p:txBody>
+      </p:sp>
+      <p:sp>
+        <p:nvSpPr>
+          <p:cNvPr id="3" name="Espaço Reservado para Conteúdo 2">
+            <a:extLst>
+              <a:ext uri="{FF2B5EF4-FFF2-40B4-BE49-F238E27FC236}">
+                <a16:creationId xmlns:a16="http://schemas.microsoft.com/office/drawing/2014/main" id="{A83E2ED0-A76F-CDED-63B6-0733F21C6183}"/>
+              </a:ext>
+            </a:extLst>
+          </p:cNvPr>
+          <p:cNvSpPr>
+            <a:spLocks noGrp="1"/>
+          </p:cNvSpPr>
+          <p:nvPr>
+            <p:ph idx="1"/>
+          </p:nvPr>
+        </p:nvSpPr>
+        <p:spPr>
+          <a:xfrm>
+            <a:off x="1097280" y="1845734"/>
+            <a:ext cx="10058400" cy="4023360"/>
+          </a:xfrm>
+        </p:spPr>
+        <p:txBody>
+          <a:bodyPr>
+            <a:normAutofit/>
+          </a:bodyPr>
+          <a:lstStyle/>
+          <a:p>
+            <a:r>
+              <a:rPr lang="pt-BR" sz="2400" dirty="0"/>
+              <a:t>A Web 3.0 é a terceira onda, conhecida como Web Semântica, onde propõem:</a:t>
+            </a:r>
+          </a:p>
+          <a:p>
+            <a:pPr lvl="1"/>
+            <a:r>
+              <a:rPr lang="pt-BR" dirty="0"/>
+              <a:t>Facilidade de comunidades online, sem substituir as comunidades físicas (comunidades de jogadores com deficiência teve um aumento em relação a comunidades físicas);</a:t>
+            </a:r>
+          </a:p>
+          <a:p>
+            <a:pPr lvl="1"/>
+            <a:endParaRPr lang="pt-BR" dirty="0"/>
+          </a:p>
+        </p:txBody>
+      </p:sp>
+    </p:spTree>
+    <p:extLst>
+      <p:ext uri="{BB962C8B-B14F-4D97-AF65-F5344CB8AC3E}">
+        <p14:creationId xmlns:p14="http://schemas.microsoft.com/office/powerpoint/2010/main" val="2632514057"/>
+      </p:ext>
+    </p:extLst>
+  </p:cSld>
+  <p:clrMapOvr>
+    <a:masterClrMapping/>
+  </p:clrMapOvr>
+</p:sld>
+</file>
+
+<file path=ppt/slides/slide15.xml><?xml version="1.0" encoding="utf-8"?>
+<p:sld xmlns:a="http://schemas.openxmlformats.org/drawingml/2006/main" xmlns:r="http://schemas.openxmlformats.org/officeDocument/2006/relationships" xmlns:p="http://schemas.openxmlformats.org/presentationml/2006/main">
+  <p:cSld>
+    <p:spTree>
+      <p:nvGrpSpPr>
+        <p:cNvPr id="1" name=""/>
+        <p:cNvGrpSpPr/>
+        <p:nvPr/>
+      </p:nvGrpSpPr>
+      <p:grpSpPr>
+        <a:xfrm>
+          <a:off x="0" y="0"/>
+          <a:ext cx="0" cy="0"/>
+          <a:chOff x="0" y="0"/>
+          <a:chExt cx="0" cy="0"/>
+        </a:xfrm>
+      </p:grpSpPr>
+      <p:sp>
+        <p:nvSpPr>
+          <p:cNvPr id="2" name="Título 1">
+            <a:extLst>
+              <a:ext uri="{FF2B5EF4-FFF2-40B4-BE49-F238E27FC236}">
+                <a16:creationId xmlns:a16="http://schemas.microsoft.com/office/drawing/2014/main" id="{D9D1B228-D7A5-429B-6D5D-39CB076C54A3}"/>
+              </a:ext>
+            </a:extLst>
+          </p:cNvPr>
+          <p:cNvSpPr>
+            <a:spLocks noGrp="1"/>
+          </p:cNvSpPr>
+          <p:nvPr>
+            <p:ph type="title"/>
+          </p:nvPr>
+        </p:nvSpPr>
+        <p:spPr/>
+        <p:txBody>
+          <a:bodyPr/>
+          <a:lstStyle/>
+          <a:p>
+            <a:r>
+              <a:rPr lang="pt-BR" dirty="0"/>
+              <a:t>WEB 2.0</a:t>
+            </a:r>
+          </a:p>
+        </p:txBody>
+      </p:sp>
+      <p:sp>
+        <p:nvSpPr>
+          <p:cNvPr id="3" name="Espaço Reservado para Conteúdo 2">
+            <a:extLst>
+              <a:ext uri="{FF2B5EF4-FFF2-40B4-BE49-F238E27FC236}">
+                <a16:creationId xmlns:a16="http://schemas.microsoft.com/office/drawing/2014/main" id="{A83E2ED0-A76F-CDED-63B6-0733F21C6183}"/>
+              </a:ext>
+            </a:extLst>
+          </p:cNvPr>
+          <p:cNvSpPr>
+            <a:spLocks noGrp="1"/>
+          </p:cNvSpPr>
+          <p:nvPr>
+            <p:ph idx="1"/>
+          </p:nvPr>
+        </p:nvSpPr>
+        <p:spPr>
+          <a:xfrm>
+            <a:off x="1097280" y="1845734"/>
+            <a:ext cx="10058400" cy="4023360"/>
+          </a:xfrm>
+        </p:spPr>
+        <p:txBody>
+          <a:bodyPr>
+            <a:normAutofit/>
+          </a:bodyPr>
+          <a:lstStyle/>
+          <a:p>
+            <a:r>
+              <a:rPr lang="pt-BR" sz="2400" dirty="0"/>
+              <a:t>A Web 2.0 passou de um ambiente isolado para um ambiente formador de estrutura integrada de funcionalidades e conteúdo.</a:t>
+            </a:r>
+          </a:p>
+          <a:p>
+            <a:r>
+              <a:rPr lang="pt-BR" sz="2400" dirty="0"/>
+              <a:t>A estrutura conta com atores que criam e utilizam conteúdo em plataformas, onde o conteúdo segue:</a:t>
+            </a:r>
+          </a:p>
+          <a:p>
+            <a:pPr lvl="1"/>
+            <a:r>
+              <a:rPr lang="pt-BR" sz="2200" dirty="0"/>
+              <a:t>Princípios da objetividade;</a:t>
+            </a:r>
+          </a:p>
+          <a:p>
+            <a:pPr lvl="1"/>
+            <a:r>
+              <a:rPr lang="pt-BR" sz="2200" dirty="0"/>
+              <a:t>Escopo definido;</a:t>
+            </a:r>
+          </a:p>
+          <a:p>
+            <a:pPr lvl="1"/>
+            <a:r>
+              <a:rPr lang="pt-BR" sz="2200" dirty="0"/>
+              <a:t>Foco central;</a:t>
+            </a:r>
+          </a:p>
+          <a:p>
+            <a:pPr lvl="1"/>
+            <a:r>
+              <a:rPr lang="pt-BR" sz="2200" dirty="0"/>
+              <a:t>Facilidade de aprendizado;</a:t>
+            </a:r>
+          </a:p>
+          <a:p>
+            <a:pPr lvl="1"/>
+            <a:r>
+              <a:rPr lang="pt-BR" sz="2200" dirty="0"/>
+              <a:t>Boa acessibilidade.</a:t>
+            </a:r>
+          </a:p>
+          <a:p>
+            <a:r>
+              <a:rPr lang="pt-BR" sz="2400" dirty="0"/>
+              <a:t>O conteúdo é o foco, e ele não deve ser estático, mas apresentar interação.</a:t>
+            </a:r>
+          </a:p>
+          <a:p>
+            <a:endParaRPr lang="pt-BR" sz="2400" dirty="0"/>
+          </a:p>
+          <a:p>
+            <a:endParaRPr lang="pt-BR" dirty="0"/>
+          </a:p>
+        </p:txBody>
+      </p:sp>
+    </p:spTree>
+    <p:extLst>
+      <p:ext uri="{BB962C8B-B14F-4D97-AF65-F5344CB8AC3E}">
+        <p14:creationId xmlns:p14="http://schemas.microsoft.com/office/powerpoint/2010/main" val="1707938493"/>
+      </p:ext>
+    </p:extLst>
+  </p:cSld>
+  <p:clrMapOvr>
+    <a:masterClrMapping/>
+  </p:clrMapOvr>
+</p:sld>
+</file>
+
+<file path=ppt/slides/slide16.xml><?xml version="1.0" encoding="utf-8"?>
+<p:sld xmlns:a="http://schemas.openxmlformats.org/drawingml/2006/main" xmlns:r="http://schemas.openxmlformats.org/officeDocument/2006/relationships" xmlns:p="http://schemas.openxmlformats.org/presentationml/2006/main">
+  <p:cSld>
+    <p:spTree>
+      <p:nvGrpSpPr>
+        <p:cNvPr id="1" name=""/>
+        <p:cNvGrpSpPr/>
+        <p:nvPr/>
+      </p:nvGrpSpPr>
+      <p:grpSpPr>
+        <a:xfrm>
+          <a:off x="0" y="0"/>
+          <a:ext cx="0" cy="0"/>
+          <a:chOff x="0" y="0"/>
+          <a:chExt cx="0" cy="0"/>
+        </a:xfrm>
+      </p:grpSpPr>
+      <p:sp>
+        <p:nvSpPr>
+          <p:cNvPr id="2" name="Título 1">
+            <a:extLst>
+              <a:ext uri="{FF2B5EF4-FFF2-40B4-BE49-F238E27FC236}">
+                <a16:creationId xmlns:a16="http://schemas.microsoft.com/office/drawing/2014/main" id="{D9D1B228-D7A5-429B-6D5D-39CB076C54A3}"/>
+              </a:ext>
+            </a:extLst>
+          </p:cNvPr>
+          <p:cNvSpPr>
+            <a:spLocks noGrp="1"/>
+          </p:cNvSpPr>
+          <p:nvPr>
+            <p:ph type="title"/>
+          </p:nvPr>
+        </p:nvSpPr>
+        <p:spPr/>
+        <p:txBody>
+          <a:bodyPr/>
+          <a:lstStyle/>
+          <a:p>
+            <a:r>
+              <a:rPr lang="pt-BR" dirty="0"/>
+              <a:t>WEB 2.0</a:t>
+            </a:r>
+            <a:br>
+              <a:rPr lang="pt-BR" dirty="0"/>
+            </a:br>
+            <a:r>
+              <a:rPr lang="pt-BR" sz="2400" dirty="0"/>
+              <a:t>REDES SOCIAIS</a:t>
+            </a:r>
+          </a:p>
+        </p:txBody>
+      </p:sp>
+      <p:sp>
+        <p:nvSpPr>
+          <p:cNvPr id="3" name="Espaço Reservado para Conteúdo 2">
+            <a:extLst>
+              <a:ext uri="{FF2B5EF4-FFF2-40B4-BE49-F238E27FC236}">
+                <a16:creationId xmlns:a16="http://schemas.microsoft.com/office/drawing/2014/main" id="{A83E2ED0-A76F-CDED-63B6-0733F21C6183}"/>
+              </a:ext>
+            </a:extLst>
+          </p:cNvPr>
+          <p:cNvSpPr>
+            <a:spLocks noGrp="1"/>
+          </p:cNvSpPr>
+          <p:nvPr>
+            <p:ph idx="1"/>
+          </p:nvPr>
+        </p:nvSpPr>
+        <p:spPr>
+          <a:xfrm>
+            <a:off x="1097280" y="1845734"/>
+            <a:ext cx="10058400" cy="4023360"/>
+          </a:xfrm>
+        </p:spPr>
+        <p:txBody>
+          <a:bodyPr>
+            <a:normAutofit/>
+          </a:bodyPr>
+          <a:lstStyle/>
+          <a:p>
+            <a:r>
+              <a:rPr lang="pt-BR" sz="2400" dirty="0"/>
+              <a:t>As redes sociais aproximam as empresas dos usuários. Quem tem acesso as redes sociais dificilmente não sai de casa sem acessar a rede social, e mesmo longe de casa é possível se conectar a rede e ver conteúdos sobre diversos temas.</a:t>
+            </a:r>
+          </a:p>
+          <a:p>
+            <a:r>
+              <a:rPr lang="pt-BR" sz="2400" dirty="0"/>
+              <a:t>As redes são organizadas de forma centralizada, descentralizada e distribuída. São descentralizadas quando sua conexão é feita por um nó de rede de distribuição.</a:t>
+            </a:r>
+          </a:p>
+          <a:p>
+            <a:r>
+              <a:rPr lang="pt-BR" sz="2400" dirty="0"/>
+              <a:t>Existem hoje diversas redes que as pessoas podem escolher utilizar, entre elas as mais comuns: Youtube, WhatsApp, </a:t>
+            </a:r>
+            <a:r>
+              <a:rPr lang="pt-BR" sz="2400" dirty="0" err="1"/>
+              <a:t>Linkedin</a:t>
+            </a:r>
+            <a:r>
+              <a:rPr lang="pt-BR" sz="2400" dirty="0"/>
+              <a:t>, Instagram, X.</a:t>
+            </a:r>
+          </a:p>
+          <a:p>
+            <a:endParaRPr lang="pt-BR" dirty="0"/>
+          </a:p>
+        </p:txBody>
+      </p:sp>
+    </p:spTree>
+    <p:extLst>
+      <p:ext uri="{BB962C8B-B14F-4D97-AF65-F5344CB8AC3E}">
+        <p14:creationId xmlns:p14="http://schemas.microsoft.com/office/powerpoint/2010/main" val="3848419836"/>
+      </p:ext>
+    </p:extLst>
+  </p:cSld>
+  <p:clrMapOvr>
+    <a:masterClrMapping/>
+  </p:clrMapOvr>
+</p:sld>
+</file>
+
+<file path=ppt/slides/slide17.xml><?xml version="1.0" encoding="utf-8"?>
+<p:sld xmlns:a="http://schemas.openxmlformats.org/drawingml/2006/main" xmlns:r="http://schemas.openxmlformats.org/officeDocument/2006/relationships" xmlns:p="http://schemas.openxmlformats.org/presentationml/2006/main">
+  <p:cSld>
+    <p:spTree>
+      <p:nvGrpSpPr>
+        <p:cNvPr id="1" name=""/>
+        <p:cNvGrpSpPr/>
+        <p:nvPr/>
+      </p:nvGrpSpPr>
+      <p:grpSpPr>
+        <a:xfrm>
+          <a:off x="0" y="0"/>
+          <a:ext cx="0" cy="0"/>
+          <a:chOff x="0" y="0"/>
+          <a:chExt cx="0" cy="0"/>
+        </a:xfrm>
+      </p:grpSpPr>
+      <p:sp>
+        <p:nvSpPr>
+          <p:cNvPr id="2" name="Título 1">
+            <a:extLst>
+              <a:ext uri="{FF2B5EF4-FFF2-40B4-BE49-F238E27FC236}">
+                <a16:creationId xmlns:a16="http://schemas.microsoft.com/office/drawing/2014/main" id="{D9D1B228-D7A5-429B-6D5D-39CB076C54A3}"/>
+              </a:ext>
+            </a:extLst>
+          </p:cNvPr>
+          <p:cNvSpPr>
+            <a:spLocks noGrp="1"/>
+          </p:cNvSpPr>
+          <p:nvPr>
+            <p:ph type="title"/>
+          </p:nvPr>
+        </p:nvSpPr>
+        <p:spPr/>
+        <p:txBody>
+          <a:bodyPr/>
+          <a:lstStyle/>
+          <a:p>
+            <a:r>
+              <a:rPr lang="pt-BR" dirty="0"/>
+              <a:t>WEB 2.0</a:t>
+            </a:r>
+            <a:br>
+              <a:rPr lang="pt-BR" dirty="0"/>
+            </a:br>
+            <a:r>
+              <a:rPr lang="pt-BR" sz="2400" dirty="0"/>
+              <a:t>APLICAÇÕES WEB 2.0 COMO PLATAFORMA</a:t>
+            </a:r>
+          </a:p>
+        </p:txBody>
+      </p:sp>
+      <p:sp>
+        <p:nvSpPr>
+          <p:cNvPr id="3" name="Espaço Reservado para Conteúdo 2">
+            <a:extLst>
+              <a:ext uri="{FF2B5EF4-FFF2-40B4-BE49-F238E27FC236}">
+                <a16:creationId xmlns:a16="http://schemas.microsoft.com/office/drawing/2014/main" id="{A83E2ED0-A76F-CDED-63B6-0733F21C6183}"/>
+              </a:ext>
+            </a:extLst>
+          </p:cNvPr>
+          <p:cNvSpPr>
+            <a:spLocks noGrp="1"/>
+          </p:cNvSpPr>
+          <p:nvPr>
+            <p:ph idx="1"/>
+          </p:nvPr>
+        </p:nvSpPr>
+        <p:spPr>
+          <a:xfrm>
+            <a:off x="1097280" y="1845734"/>
+            <a:ext cx="10058400" cy="4478866"/>
+          </a:xfrm>
+        </p:spPr>
+        <p:txBody>
+          <a:bodyPr>
+            <a:normAutofit/>
+          </a:bodyPr>
+          <a:lstStyle/>
+          <a:p>
+            <a:r>
+              <a:rPr lang="pt-BR" sz="2200" dirty="0"/>
+              <a:t>Antes, o princípio de navegação de uma rede era por meio de documentos HTML. Por meio de cliques, aguarde e recarregar o conteúdo era transmitido. Essas mesmas características se fazem presentes nas aplicações </a:t>
+            </a:r>
+            <a:r>
+              <a:rPr lang="pt-BR" sz="2200" i="1" dirty="0"/>
+              <a:t>Rich Internet </a:t>
+            </a:r>
+            <a:r>
+              <a:rPr lang="pt-BR" sz="2200" i="1" dirty="0" err="1"/>
+              <a:t>Applications</a:t>
+            </a:r>
+            <a:r>
+              <a:rPr lang="pt-BR" sz="2200" i="1" dirty="0"/>
+              <a:t> </a:t>
+            </a:r>
+            <a:r>
+              <a:rPr lang="pt-BR" sz="2200" dirty="0"/>
+              <a:t>(RIA), que é uma aplicação WEB com as mesmas características de software tradicionais presentes em uma estação de trabalho.</a:t>
+            </a:r>
+          </a:p>
+          <a:p>
+            <a:r>
+              <a:rPr lang="pt-BR" sz="2200" dirty="0"/>
+              <a:t>No RIA, a aplicação é assíncrono, e não depende de um servidor. Um catalisador, chamado </a:t>
+            </a:r>
+            <a:r>
+              <a:rPr lang="pt-BR" sz="2200" i="1" dirty="0" err="1"/>
+              <a:t>Asynchronus</a:t>
+            </a:r>
+            <a:r>
+              <a:rPr lang="pt-BR" sz="2200" i="1" dirty="0"/>
+              <a:t> </a:t>
+            </a:r>
+            <a:r>
+              <a:rPr lang="pt-BR" sz="2200" i="1" dirty="0" err="1"/>
+              <a:t>Javascrips</a:t>
+            </a:r>
+            <a:r>
+              <a:rPr lang="pt-BR" sz="2200" i="1" dirty="0"/>
+              <a:t> </a:t>
+            </a:r>
+            <a:r>
+              <a:rPr lang="pt-BR" sz="2200" i="1" dirty="0" err="1"/>
+              <a:t>Anx</a:t>
+            </a:r>
+            <a:r>
+              <a:rPr lang="pt-BR" sz="2200" i="1" dirty="0"/>
+              <a:t> XML </a:t>
+            </a:r>
+            <a:r>
+              <a:rPr lang="pt-BR" sz="2200" dirty="0"/>
+              <a:t>(AJAX) faz com que cada um faça sua parte, apoiando a construção </a:t>
+            </a:r>
+            <a:r>
+              <a:rPr lang="pt-BR" sz="2200" i="1" dirty="0"/>
+              <a:t>web</a:t>
+            </a:r>
+            <a:r>
+              <a:rPr lang="pt-BR" sz="2200" dirty="0"/>
+              <a:t> dinâmica e criativa. O seu principio é:</a:t>
+            </a:r>
+          </a:p>
+          <a:p>
+            <a:pPr lvl="1"/>
+            <a:r>
+              <a:rPr lang="pt-BR" sz="2000" i="1" dirty="0"/>
+              <a:t>O navegador hospeda um aplicativo, não o conteúdo;</a:t>
+            </a:r>
+          </a:p>
+          <a:p>
+            <a:pPr lvl="1"/>
+            <a:r>
+              <a:rPr lang="pt-BR" sz="2000" i="1" dirty="0"/>
+              <a:t>O servidor entrega dados, não conteúdo;</a:t>
+            </a:r>
+          </a:p>
+          <a:p>
+            <a:pPr lvl="1"/>
+            <a:r>
+              <a:rPr lang="pt-BR" sz="2000" i="1" dirty="0"/>
+              <a:t>A interação do usuário com o aplicativo pode ser fluente e continua;</a:t>
+            </a:r>
+          </a:p>
+          <a:p>
+            <a:pPr lvl="1"/>
+            <a:r>
+              <a:rPr lang="pt-BR" sz="2000" i="1" dirty="0"/>
+              <a:t>A programação para isso funcionar requer disciplina.</a:t>
+            </a:r>
+          </a:p>
+        </p:txBody>
+      </p:sp>
+    </p:spTree>
+    <p:extLst>
+      <p:ext uri="{BB962C8B-B14F-4D97-AF65-F5344CB8AC3E}">
+        <p14:creationId xmlns:p14="http://schemas.microsoft.com/office/powerpoint/2010/main" val="1603792258"/>
+      </p:ext>
+    </p:extLst>
+  </p:cSld>
+  <p:clrMapOvr>
+    <a:masterClrMapping/>
+  </p:clrMapOvr>
+</p:sld>
+</file>
+
+<file path=ppt/slides/slide18.xml><?xml version="1.0" encoding="utf-8"?>
+<p:sld xmlns:a="http://schemas.openxmlformats.org/drawingml/2006/main" xmlns:r="http://schemas.openxmlformats.org/officeDocument/2006/relationships" xmlns:p="http://schemas.openxmlformats.org/presentationml/2006/main">
+  <p:cSld>
+    <p:spTree>
+      <p:nvGrpSpPr>
+        <p:cNvPr id="1" name=""/>
+        <p:cNvGrpSpPr/>
+        <p:nvPr/>
+      </p:nvGrpSpPr>
+      <p:grpSpPr>
+        <a:xfrm>
+          <a:off x="0" y="0"/>
+          <a:ext cx="0" cy="0"/>
+          <a:chOff x="0" y="0"/>
+          <a:chExt cx="0" cy="0"/>
+        </a:xfrm>
+      </p:grpSpPr>
+      <p:sp>
+        <p:nvSpPr>
+          <p:cNvPr id="2" name="Título 1">
+            <a:extLst>
+              <a:ext uri="{FF2B5EF4-FFF2-40B4-BE49-F238E27FC236}">
+                <a16:creationId xmlns:a16="http://schemas.microsoft.com/office/drawing/2014/main" id="{D9D1B228-D7A5-429B-6D5D-39CB076C54A3}"/>
+              </a:ext>
+            </a:extLst>
+          </p:cNvPr>
+          <p:cNvSpPr>
+            <a:spLocks noGrp="1"/>
+          </p:cNvSpPr>
+          <p:nvPr>
+            <p:ph type="title"/>
+          </p:nvPr>
+        </p:nvSpPr>
+        <p:spPr/>
+        <p:txBody>
+          <a:bodyPr/>
+          <a:lstStyle/>
+          <a:p>
+            <a:r>
+              <a:rPr lang="pt-BR" dirty="0"/>
+              <a:t>WEB 2.0</a:t>
+            </a:r>
+            <a:br>
+              <a:rPr lang="pt-BR" dirty="0"/>
+            </a:br>
+            <a:r>
+              <a:rPr lang="pt-BR" sz="2400" dirty="0"/>
+              <a:t>WEB 2.0, REDES SOCIAIS E MUNDO EMPRESARIAL</a:t>
+            </a:r>
+          </a:p>
+        </p:txBody>
+      </p:sp>
+      <p:sp>
+        <p:nvSpPr>
+          <p:cNvPr id="3" name="Espaço Reservado para Conteúdo 2">
+            <a:extLst>
+              <a:ext uri="{FF2B5EF4-FFF2-40B4-BE49-F238E27FC236}">
+                <a16:creationId xmlns:a16="http://schemas.microsoft.com/office/drawing/2014/main" id="{A83E2ED0-A76F-CDED-63B6-0733F21C6183}"/>
+              </a:ext>
+            </a:extLst>
+          </p:cNvPr>
+          <p:cNvSpPr>
+            <a:spLocks noGrp="1"/>
+          </p:cNvSpPr>
+          <p:nvPr>
+            <p:ph idx="1"/>
+          </p:nvPr>
+        </p:nvSpPr>
+        <p:spPr>
+          <a:xfrm>
+            <a:off x="1097280" y="1845734"/>
+            <a:ext cx="10058400" cy="4023360"/>
+          </a:xfrm>
+        </p:spPr>
+        <p:txBody>
+          <a:bodyPr>
+            <a:normAutofit/>
+          </a:bodyPr>
+          <a:lstStyle/>
+          <a:p>
+            <a:r>
+              <a:rPr lang="pt-BR" sz="2400" dirty="0"/>
+              <a:t>Qualquer profissional precisa conhecer e utilizar os canais de uma empresa, seja uma rede interna ou externa.</a:t>
+            </a:r>
+          </a:p>
+          <a:p>
+            <a:r>
+              <a:rPr lang="pt-BR" sz="2400" dirty="0"/>
+              <a:t>A web fornece rapidez e agilidade no fluxo de informações, e proporcionam melhoria de interatividade por meio do uso dos sistemas de informação e atendimento aos clientes e boa comunicação.</a:t>
+            </a:r>
+          </a:p>
+          <a:p>
+            <a:endParaRPr lang="pt-BR" dirty="0"/>
+          </a:p>
+        </p:txBody>
+      </p:sp>
+    </p:spTree>
+    <p:extLst>
+      <p:ext uri="{BB962C8B-B14F-4D97-AF65-F5344CB8AC3E}">
+        <p14:creationId xmlns:p14="http://schemas.microsoft.com/office/powerpoint/2010/main" val="1329163841"/>
+      </p:ext>
+    </p:extLst>
+  </p:cSld>
+  <p:clrMapOvr>
+    <a:masterClrMapping/>
+  </p:clrMapOvr>
+</p:sld>
+</file>
+
+<file path=ppt/slides/slide19.xml><?xml version="1.0" encoding="utf-8"?>
+<p:sld xmlns:a="http://schemas.openxmlformats.org/drawingml/2006/main" xmlns:r="http://schemas.openxmlformats.org/officeDocument/2006/relationships" xmlns:p="http://schemas.openxmlformats.org/presentationml/2006/main">
+  <p:cSld>
+    <p:spTree>
+      <p:nvGrpSpPr>
+        <p:cNvPr id="1" name=""/>
+        <p:cNvGrpSpPr/>
+        <p:nvPr/>
+      </p:nvGrpSpPr>
+      <p:grpSpPr>
+        <a:xfrm>
+          <a:off x="0" y="0"/>
+          <a:ext cx="0" cy="0"/>
+          <a:chOff x="0" y="0"/>
+          <a:chExt cx="0" cy="0"/>
+        </a:xfrm>
+      </p:grpSpPr>
+      <p:sp>
+        <p:nvSpPr>
+          <p:cNvPr id="2" name="Título 1">
+            <a:extLst>
+              <a:ext uri="{FF2B5EF4-FFF2-40B4-BE49-F238E27FC236}">
+                <a16:creationId xmlns:a16="http://schemas.microsoft.com/office/drawing/2014/main" id="{0A2CF07B-2FF0-C615-0375-36D1CDA0401D}"/>
+              </a:ext>
+            </a:extLst>
+          </p:cNvPr>
+          <p:cNvSpPr>
+            <a:spLocks noGrp="1"/>
+          </p:cNvSpPr>
+          <p:nvPr>
+            <p:ph type="title"/>
+          </p:nvPr>
+        </p:nvSpPr>
+        <p:spPr>
+          <a:xfrm>
+            <a:off x="1097280" y="263527"/>
+            <a:ext cx="10058400" cy="1450757"/>
+          </a:xfrm>
+        </p:spPr>
+        <p:txBody>
+          <a:bodyPr/>
+          <a:lstStyle/>
+          <a:p>
+            <a:r>
+              <a:rPr lang="pt-BR" dirty="0"/>
+              <a:t>Finalizando a nossa aula</a:t>
+            </a:r>
+          </a:p>
+        </p:txBody>
+      </p:sp>
+      <p:sp>
+        <p:nvSpPr>
+          <p:cNvPr id="3" name="Espaço Reservado para Conteúdo 2">
+            <a:extLst>
+              <a:ext uri="{FF2B5EF4-FFF2-40B4-BE49-F238E27FC236}">
+                <a16:creationId xmlns:a16="http://schemas.microsoft.com/office/drawing/2014/main" id="{33FEF083-B047-DB19-7BD5-A18267DFDE88}"/>
+              </a:ext>
+            </a:extLst>
+          </p:cNvPr>
+          <p:cNvSpPr>
+            <a:spLocks noGrp="1"/>
+          </p:cNvSpPr>
+          <p:nvPr>
+            <p:ph idx="1"/>
+          </p:nvPr>
+        </p:nvSpPr>
+        <p:spPr/>
+        <p:txBody>
+          <a:bodyPr>
+            <a:normAutofit/>
+          </a:bodyPr>
+          <a:lstStyle/>
+          <a:p>
+            <a:r>
+              <a:rPr lang="pt-BR" sz="2200" dirty="0"/>
+              <a:t>Lembrete:</a:t>
+            </a:r>
+          </a:p>
+          <a:p>
+            <a:pPr lvl="1"/>
+            <a:r>
+              <a:rPr lang="pt-BR" sz="2000" dirty="0"/>
+              <a:t>O conteúdo foi revisado da apostila;</a:t>
+            </a:r>
+          </a:p>
+          <a:p>
+            <a:pPr lvl="1"/>
+            <a:r>
+              <a:rPr lang="pt-BR" sz="2000" dirty="0"/>
+              <a:t>Se haver duvidas, falem com o professor;</a:t>
+            </a:r>
+          </a:p>
+          <a:p>
+            <a:pPr lvl="1"/>
+            <a:endParaRPr lang="pt-BR" sz="2000" dirty="0"/>
+          </a:p>
+        </p:txBody>
+      </p:sp>
+    </p:spTree>
+    <p:extLst>
+      <p:ext uri="{BB962C8B-B14F-4D97-AF65-F5344CB8AC3E}">
+        <p14:creationId xmlns:p14="http://schemas.microsoft.com/office/powerpoint/2010/main" val="1634903595"/>
       </p:ext>
     </p:extLst>
   </p:cSld>

</xml_diff>